<commit_message>
rebuild (and fix a broken internal link)
</commit_message>
<xml_diff>
--- a/docs/discord/_sources/logo.pptx
+++ b/docs/discord/_sources/logo.pptx
@@ -8,10 +8,11 @@
     <p:sldId id="256" r:id="rId2"/>
     <p:sldId id="257" r:id="rId3"/>
     <p:sldId id="258" r:id="rId4"/>
-    <p:sldId id="259" r:id="rId5"/>
-    <p:sldId id="260" r:id="rId6"/>
-    <p:sldId id="261" r:id="rId7"/>
-    <p:sldId id="262" r:id="rId8"/>
+    <p:sldId id="263" r:id="rId5"/>
+    <p:sldId id="259" r:id="rId6"/>
+    <p:sldId id="260" r:id="rId7"/>
+    <p:sldId id="261" r:id="rId8"/>
+    <p:sldId id="262" r:id="rId9"/>
   </p:sldIdLst>
   <p:sldSz cx="12192000" cy="6858000"/>
   <p:notesSz cx="6858000" cy="9144000"/>
@@ -276,7 +277,7 @@
           <a:p>
             <a:fld id="{6E0FB558-144A-455E-BDA2-55E85E7CDA26}" type="datetimeFigureOut">
               <a:rPr lang="en-US" smtClean="0"/>
-              <a:t>9/10/2022</a:t>
+              <a:t>12/15/2023</a:t>
             </a:fld>
             <a:endParaRPr lang="en-US"/>
           </a:p>
@@ -474,7 +475,7 @@
           <a:p>
             <a:fld id="{6E0FB558-144A-455E-BDA2-55E85E7CDA26}" type="datetimeFigureOut">
               <a:rPr lang="en-US" smtClean="0"/>
-              <a:t>9/10/2022</a:t>
+              <a:t>12/15/2023</a:t>
             </a:fld>
             <a:endParaRPr lang="en-US"/>
           </a:p>
@@ -682,7 +683,7 @@
           <a:p>
             <a:fld id="{6E0FB558-144A-455E-BDA2-55E85E7CDA26}" type="datetimeFigureOut">
               <a:rPr lang="en-US" smtClean="0"/>
-              <a:t>9/10/2022</a:t>
+              <a:t>12/15/2023</a:t>
             </a:fld>
             <a:endParaRPr lang="en-US"/>
           </a:p>
@@ -880,7 +881,7 @@
           <a:p>
             <a:fld id="{6E0FB558-144A-455E-BDA2-55E85E7CDA26}" type="datetimeFigureOut">
               <a:rPr lang="en-US" smtClean="0"/>
-              <a:t>9/10/2022</a:t>
+              <a:t>12/15/2023</a:t>
             </a:fld>
             <a:endParaRPr lang="en-US"/>
           </a:p>
@@ -1155,7 +1156,7 @@
           <a:p>
             <a:fld id="{6E0FB558-144A-455E-BDA2-55E85E7CDA26}" type="datetimeFigureOut">
               <a:rPr lang="en-US" smtClean="0"/>
-              <a:t>9/10/2022</a:t>
+              <a:t>12/15/2023</a:t>
             </a:fld>
             <a:endParaRPr lang="en-US"/>
           </a:p>
@@ -1420,7 +1421,7 @@
           <a:p>
             <a:fld id="{6E0FB558-144A-455E-BDA2-55E85E7CDA26}" type="datetimeFigureOut">
               <a:rPr lang="en-US" smtClean="0"/>
-              <a:t>9/10/2022</a:t>
+              <a:t>12/15/2023</a:t>
             </a:fld>
             <a:endParaRPr lang="en-US"/>
           </a:p>
@@ -1832,7 +1833,7 @@
           <a:p>
             <a:fld id="{6E0FB558-144A-455E-BDA2-55E85E7CDA26}" type="datetimeFigureOut">
               <a:rPr lang="en-US" smtClean="0"/>
-              <a:t>9/10/2022</a:t>
+              <a:t>12/15/2023</a:t>
             </a:fld>
             <a:endParaRPr lang="en-US"/>
           </a:p>
@@ -1973,7 +1974,7 @@
           <a:p>
             <a:fld id="{6E0FB558-144A-455E-BDA2-55E85E7CDA26}" type="datetimeFigureOut">
               <a:rPr lang="en-US" smtClean="0"/>
-              <a:t>9/10/2022</a:t>
+              <a:t>12/15/2023</a:t>
             </a:fld>
             <a:endParaRPr lang="en-US"/>
           </a:p>
@@ -2086,7 +2087,7 @@
           <a:p>
             <a:fld id="{6E0FB558-144A-455E-BDA2-55E85E7CDA26}" type="datetimeFigureOut">
               <a:rPr lang="en-US" smtClean="0"/>
-              <a:t>9/10/2022</a:t>
+              <a:t>12/15/2023</a:t>
             </a:fld>
             <a:endParaRPr lang="en-US"/>
           </a:p>
@@ -2397,7 +2398,7 @@
           <a:p>
             <a:fld id="{6E0FB558-144A-455E-BDA2-55E85E7CDA26}" type="datetimeFigureOut">
               <a:rPr lang="en-US" smtClean="0"/>
-              <a:t>9/10/2022</a:t>
+              <a:t>12/15/2023</a:t>
             </a:fld>
             <a:endParaRPr lang="en-US"/>
           </a:p>
@@ -2685,7 +2686,7 @@
           <a:p>
             <a:fld id="{6E0FB558-144A-455E-BDA2-55E85E7CDA26}" type="datetimeFigureOut">
               <a:rPr lang="en-US" smtClean="0"/>
-              <a:t>9/10/2022</a:t>
+              <a:t>12/15/2023</a:t>
             </a:fld>
             <a:endParaRPr lang="en-US"/>
           </a:p>
@@ -2926,7 +2927,7 @@
           <a:p>
             <a:fld id="{6E0FB558-144A-455E-BDA2-55E85E7CDA26}" type="datetimeFigureOut">
               <a:rPr lang="en-US" smtClean="0"/>
-              <a:t>9/10/2022</a:t>
+              <a:t>12/15/2023</a:t>
             </a:fld>
             <a:endParaRPr lang="en-US"/>
           </a:p>
@@ -4688,6 +4689,553 @@
 </file>
 
 <file path=ppt/slides/slide4.xml><?xml version="1.0" encoding="utf-8"?>
+<p:sld xmlns:a="http://schemas.openxmlformats.org/drawingml/2006/main" xmlns:r="http://schemas.openxmlformats.org/officeDocument/2006/relationships" xmlns:p="http://schemas.openxmlformats.org/presentationml/2006/main">
+  <p:cSld>
+    <p:spTree>
+      <p:nvGrpSpPr>
+        <p:cNvPr id="1" name=""/>
+        <p:cNvGrpSpPr/>
+        <p:nvPr/>
+      </p:nvGrpSpPr>
+      <p:grpSpPr>
+        <a:xfrm>
+          <a:off x="0" y="0"/>
+          <a:ext cx="0" cy="0"/>
+          <a:chOff x="0" y="0"/>
+          <a:chExt cx="0" cy="0"/>
+        </a:xfrm>
+      </p:grpSpPr>
+      <p:sp>
+        <p:nvSpPr>
+          <p:cNvPr id="13" name="Rectangle 12">
+            <a:extLst>
+              <a:ext uri="{FF2B5EF4-FFF2-40B4-BE49-F238E27FC236}">
+                <a16:creationId xmlns:a16="http://schemas.microsoft.com/office/drawing/2014/main" id="{3D1FDDC1-9711-0F2D-AF70-96AFA242A17B}"/>
+              </a:ext>
+            </a:extLst>
+          </p:cNvPr>
+          <p:cNvSpPr/>
+          <p:nvPr/>
+        </p:nvSpPr>
+        <p:spPr>
+          <a:xfrm>
+            <a:off x="2551471" y="1160206"/>
+            <a:ext cx="5663381" cy="3249562"/>
+          </a:xfrm>
+          <a:prstGeom prst="rect">
+            <a:avLst/>
+          </a:prstGeom>
+          <a:solidFill>
+            <a:schemeClr val="bg2"/>
+          </a:solidFill>
+          <a:ln>
+            <a:noFill/>
+          </a:ln>
+        </p:spPr>
+        <p:style>
+          <a:lnRef idx="2">
+            <a:schemeClr val="accent1">
+              <a:shade val="50000"/>
+            </a:schemeClr>
+          </a:lnRef>
+          <a:fillRef idx="1">
+            <a:schemeClr val="accent1"/>
+          </a:fillRef>
+          <a:effectRef idx="0">
+            <a:schemeClr val="accent1"/>
+          </a:effectRef>
+          <a:fontRef idx="minor">
+            <a:schemeClr val="lt1"/>
+          </a:fontRef>
+        </p:style>
+        <p:txBody>
+          <a:bodyPr rtlCol="0" anchor="ctr"/>
+          <a:lstStyle/>
+          <a:p>
+            <a:pPr algn="ctr"/>
+            <a:endParaRPr lang="en-GB"/>
+          </a:p>
+        </p:txBody>
+      </p:sp>
+      <p:pic>
+        <p:nvPicPr>
+          <p:cNvPr id="3" name="Picture 2" descr="A picture containing text, monitor, screenshot&#10;&#10;Description automatically generated">
+            <a:extLst>
+              <a:ext uri="{FF2B5EF4-FFF2-40B4-BE49-F238E27FC236}">
+                <a16:creationId xmlns:a16="http://schemas.microsoft.com/office/drawing/2014/main" id="{74C1E64E-8BC8-8C98-56C7-19493E45C6FA}"/>
+              </a:ext>
+            </a:extLst>
+          </p:cNvPr>
+          <p:cNvPicPr>
+            <a:picLocks noChangeAspect="1"/>
+          </p:cNvPicPr>
+          <p:nvPr/>
+        </p:nvPicPr>
+        <p:blipFill>
+          <a:blip r:embed="rId2">
+            <a:clrChange>
+              <a:clrFrom>
+                <a:srgbClr val="FFFFFF"/>
+              </a:clrFrom>
+              <a:clrTo>
+                <a:srgbClr val="FFFFFF">
+                  <a:alpha val="0"/>
+                </a:srgbClr>
+              </a:clrTo>
+            </a:clrChange>
+            <a:extLst>
+              <a:ext uri="{28A0092B-C50C-407E-A947-70E740481C1C}">
+                <a14:useLocalDpi xmlns:a14="http://schemas.microsoft.com/office/drawing/2010/main" val="0"/>
+              </a:ext>
+            </a:extLst>
+          </a:blip>
+          <a:stretch>
+            <a:fillRect/>
+          </a:stretch>
+        </p:blipFill>
+        <p:spPr>
+          <a:xfrm rot="16200000">
+            <a:off x="2638673" y="-1021174"/>
+            <a:ext cx="5406695" cy="7647039"/>
+          </a:xfrm>
+          <a:prstGeom prst="rect">
+            <a:avLst/>
+          </a:prstGeom>
+        </p:spPr>
+      </p:pic>
+      <p:sp>
+        <p:nvSpPr>
+          <p:cNvPr id="4" name="Rectangle: Rounded Corners 3">
+            <a:extLst>
+              <a:ext uri="{FF2B5EF4-FFF2-40B4-BE49-F238E27FC236}">
+                <a16:creationId xmlns:a16="http://schemas.microsoft.com/office/drawing/2014/main" id="{D92C901A-AD0F-00AB-33EF-DB3100CB469A}"/>
+              </a:ext>
+            </a:extLst>
+          </p:cNvPr>
+          <p:cNvSpPr/>
+          <p:nvPr/>
+        </p:nvSpPr>
+        <p:spPr>
+          <a:xfrm>
+            <a:off x="2717320" y="1535502"/>
+            <a:ext cx="5391509" cy="2225337"/>
+          </a:xfrm>
+          <a:prstGeom prst="roundRect">
+            <a:avLst/>
+          </a:prstGeom>
+        </p:spPr>
+        <p:style>
+          <a:lnRef idx="2">
+            <a:schemeClr val="accent1"/>
+          </a:lnRef>
+          <a:fillRef idx="1">
+            <a:schemeClr val="lt1"/>
+          </a:fillRef>
+          <a:effectRef idx="0">
+            <a:schemeClr val="accent1"/>
+          </a:effectRef>
+          <a:fontRef idx="minor">
+            <a:schemeClr val="dk1"/>
+          </a:fontRef>
+        </p:style>
+        <p:txBody>
+          <a:bodyPr rtlCol="0" anchor="ctr"/>
+          <a:lstStyle/>
+          <a:p>
+            <a:pPr algn="ctr"/>
+            <a:endParaRPr lang="en-US"/>
+          </a:p>
+        </p:txBody>
+      </p:sp>
+      <p:sp>
+        <p:nvSpPr>
+          <p:cNvPr id="5" name="TextBox 4">
+            <a:extLst>
+              <a:ext uri="{FF2B5EF4-FFF2-40B4-BE49-F238E27FC236}">
+                <a16:creationId xmlns:a16="http://schemas.microsoft.com/office/drawing/2014/main" id="{90A8C90A-4A85-83C3-670A-A490293EF34B}"/>
+              </a:ext>
+            </a:extLst>
+          </p:cNvPr>
+          <p:cNvSpPr txBox="1"/>
+          <p:nvPr/>
+        </p:nvSpPr>
+        <p:spPr>
+          <a:xfrm>
+            <a:off x="2717320" y="2132755"/>
+            <a:ext cx="5391508" cy="754053"/>
+          </a:xfrm>
+          <a:prstGeom prst="rect">
+            <a:avLst/>
+          </a:prstGeom>
+          <a:noFill/>
+        </p:spPr>
+        <p:txBody>
+          <a:bodyPr wrap="square" rtlCol="0">
+            <a:spAutoFit/>
+          </a:bodyPr>
+          <a:lstStyle/>
+          <a:p>
+            <a:r>
+              <a:rPr lang="en-US" sz="2500" b="1" dirty="0"/>
+              <a:t>Social Media, Ethics, </a:t>
+            </a:r>
+            <a:r>
+              <a:rPr lang="en-US" sz="2500" b="1"/>
+              <a:t>and Automation</a:t>
+            </a:r>
+          </a:p>
+          <a:p>
+            <a:r>
+              <a:rPr lang="en-US">
+                <a:solidFill>
+                  <a:schemeClr val="accent5"/>
+                </a:solidFill>
+              </a:rPr>
+              <a:t>#UW #iSchool</a:t>
+            </a:r>
+            <a:endParaRPr lang="en-US" sz="1600" dirty="0">
+              <a:solidFill>
+                <a:schemeClr val="accent5"/>
+              </a:solidFill>
+            </a:endParaRPr>
+          </a:p>
+        </p:txBody>
+      </p:sp>
+      <p:grpSp>
+        <p:nvGrpSpPr>
+          <p:cNvPr id="8" name="Group 7">
+            <a:extLst>
+              <a:ext uri="{FF2B5EF4-FFF2-40B4-BE49-F238E27FC236}">
+                <a16:creationId xmlns:a16="http://schemas.microsoft.com/office/drawing/2014/main" id="{5EE323FE-249A-6D6B-4BF6-3B7E671E94AF}"/>
+              </a:ext>
+            </a:extLst>
+          </p:cNvPr>
+          <p:cNvGrpSpPr/>
+          <p:nvPr/>
+        </p:nvGrpSpPr>
+        <p:grpSpPr>
+          <a:xfrm>
+            <a:off x="2882659" y="1402784"/>
+            <a:ext cx="4958752" cy="584775"/>
+            <a:chOff x="2882659" y="1402784"/>
+            <a:chExt cx="4958752" cy="584775"/>
+          </a:xfrm>
+        </p:grpSpPr>
+        <p:sp>
+          <p:nvSpPr>
+            <p:cNvPr id="7" name="TextBox 6">
+              <a:extLst>
+                <a:ext uri="{FF2B5EF4-FFF2-40B4-BE49-F238E27FC236}">
+                  <a16:creationId xmlns:a16="http://schemas.microsoft.com/office/drawing/2014/main" id="{4B5FBE9E-48C2-A8B1-E715-16C2E7D7AC85}"/>
+                </a:ext>
+              </a:extLst>
+            </p:cNvPr>
+            <p:cNvSpPr txBox="1"/>
+            <p:nvPr/>
+          </p:nvSpPr>
+          <p:spPr>
+            <a:xfrm>
+              <a:off x="2882659" y="1621450"/>
+              <a:ext cx="2966050" cy="307777"/>
+            </a:xfrm>
+            <a:prstGeom prst="rect">
+              <a:avLst/>
+            </a:prstGeom>
+            <a:noFill/>
+          </p:spPr>
+          <p:txBody>
+            <a:bodyPr wrap="square" rtlCol="0">
+              <a:spAutoFit/>
+            </a:bodyPr>
+            <a:lstStyle/>
+            <a:p>
+              <a:r>
+                <a:rPr lang="en-US" sz="1400" dirty="0">
+                  <a:solidFill>
+                    <a:srgbClr val="202122"/>
+                  </a:solidFill>
+                  <a:latin typeface="Arial" panose="020B0604020202020204" pitchFamily="34" charset="0"/>
+                </a:rPr>
+                <a:t>@Kyle Thayer  @Susan Notess</a:t>
+              </a:r>
+              <a:endParaRPr lang="en-US" sz="1400" dirty="0"/>
+            </a:p>
+          </p:txBody>
+        </p:sp>
+        <p:sp>
+          <p:nvSpPr>
+            <p:cNvPr id="12" name="TextBox 11">
+              <a:extLst>
+                <a:ext uri="{FF2B5EF4-FFF2-40B4-BE49-F238E27FC236}">
+                  <a16:creationId xmlns:a16="http://schemas.microsoft.com/office/drawing/2014/main" id="{2E55A332-DA17-40EB-FC94-1A7DACDBF008}"/>
+                </a:ext>
+              </a:extLst>
+            </p:cNvPr>
+            <p:cNvSpPr txBox="1"/>
+            <p:nvPr/>
+          </p:nvSpPr>
+          <p:spPr>
+            <a:xfrm>
+              <a:off x="7479101" y="1402784"/>
+              <a:ext cx="362310" cy="584775"/>
+            </a:xfrm>
+            <a:prstGeom prst="rect">
+              <a:avLst/>
+            </a:prstGeom>
+            <a:noFill/>
+          </p:spPr>
+          <p:txBody>
+            <a:bodyPr wrap="square" rtlCol="0">
+              <a:spAutoFit/>
+            </a:bodyPr>
+            <a:lstStyle/>
+            <a:p>
+              <a:r>
+                <a:rPr lang="en-US" sz="3200" dirty="0"/>
+                <a:t>…</a:t>
+              </a:r>
+              <a:r>
+                <a:rPr lang="en-US" dirty="0"/>
+                <a:t> </a:t>
+              </a:r>
+            </a:p>
+          </p:txBody>
+        </p:sp>
+      </p:grpSp>
+      <p:grpSp>
+        <p:nvGrpSpPr>
+          <p:cNvPr id="2" name="Group 1">
+            <a:extLst>
+              <a:ext uri="{FF2B5EF4-FFF2-40B4-BE49-F238E27FC236}">
+                <a16:creationId xmlns:a16="http://schemas.microsoft.com/office/drawing/2014/main" id="{D2F78B01-43C4-6C38-14EC-5584A1322EE9}"/>
+              </a:ext>
+            </a:extLst>
+          </p:cNvPr>
+          <p:cNvGrpSpPr/>
+          <p:nvPr/>
+        </p:nvGrpSpPr>
+        <p:grpSpPr>
+          <a:xfrm>
+            <a:off x="2752445" y="3090336"/>
+            <a:ext cx="5179149" cy="508044"/>
+            <a:chOff x="2785288" y="2802346"/>
+            <a:chExt cx="5179149" cy="508044"/>
+          </a:xfrm>
+        </p:grpSpPr>
+        <p:sp>
+          <p:nvSpPr>
+            <p:cNvPr id="6" name="TextBox 5">
+              <a:extLst>
+                <a:ext uri="{FF2B5EF4-FFF2-40B4-BE49-F238E27FC236}">
+                  <a16:creationId xmlns:a16="http://schemas.microsoft.com/office/drawing/2014/main" id="{F1E10376-EB9B-7679-9CCE-65C72DB00633}"/>
+                </a:ext>
+              </a:extLst>
+            </p:cNvPr>
+            <p:cNvSpPr txBox="1"/>
+            <p:nvPr/>
+          </p:nvSpPr>
+          <p:spPr>
+            <a:xfrm>
+              <a:off x="2785288" y="2941058"/>
+              <a:ext cx="2556733" cy="369332"/>
+            </a:xfrm>
+            <a:prstGeom prst="rect">
+              <a:avLst/>
+            </a:prstGeom>
+            <a:noFill/>
+          </p:spPr>
+          <p:txBody>
+            <a:bodyPr wrap="square" rtlCol="0">
+              <a:spAutoFit/>
+            </a:bodyPr>
+            <a:lstStyle/>
+            <a:p>
+              <a:r>
+                <a:rPr lang="en-US" sz="1400" dirty="0">
+                  <a:solidFill>
+                    <a:srgbClr val="202122"/>
+                  </a:solidFill>
+                  <a:latin typeface="Arial" panose="020B0604020202020204" pitchFamily="34" charset="0"/>
+                </a:rPr>
+                <a:t>12</a:t>
+              </a:r>
+              <a:r>
+                <a:rPr lang="en-US" b="0" i="0" dirty="0">
+                  <a:solidFill>
+                    <a:srgbClr val="202122"/>
+                  </a:solidFill>
+                  <a:effectLst/>
+                  <a:latin typeface="Arial" panose="020B0604020202020204" pitchFamily="34" charset="0"/>
+                </a:rPr>
+                <a:t>😇  </a:t>
+              </a:r>
+              <a:r>
+                <a:rPr lang="en-US" sz="1400" b="0" i="0" dirty="0">
+                  <a:solidFill>
+                    <a:srgbClr val="202122"/>
+                  </a:solidFill>
+                  <a:effectLst/>
+                  <a:latin typeface="Arial" panose="020B0604020202020204" pitchFamily="34" charset="0"/>
+                </a:rPr>
+                <a:t>35</a:t>
+              </a:r>
+              <a:r>
+                <a:rPr lang="en-US" b="0" i="0" dirty="0">
+                  <a:solidFill>
+                    <a:srgbClr val="000000"/>
+                  </a:solidFill>
+                  <a:effectLst/>
+                  <a:latin typeface="Apple Color Emoji"/>
+                </a:rPr>
+                <a:t>🤬 </a:t>
+              </a:r>
+              <a:r>
+                <a:rPr lang="en-US" sz="1400" b="0" i="0" dirty="0">
+                  <a:solidFill>
+                    <a:srgbClr val="000000"/>
+                  </a:solidFill>
+                  <a:effectLst/>
+                  <a:latin typeface="Apple Color Emoji"/>
+                </a:rPr>
+                <a:t> </a:t>
+              </a:r>
+              <a:r>
+                <a:rPr lang="en-US" sz="1400" b="0" i="0" dirty="0">
+                  <a:solidFill>
+                    <a:srgbClr val="202122"/>
+                  </a:solidFill>
+                  <a:effectLst/>
+                  <a:latin typeface="Arial" panose="020B0604020202020204" pitchFamily="34" charset="0"/>
+                </a:rPr>
+                <a:t>15</a:t>
+              </a:r>
+              <a:r>
+                <a:rPr lang="en-US" b="0" i="0" dirty="0">
+                  <a:solidFill>
+                    <a:srgbClr val="000000"/>
+                  </a:solidFill>
+                  <a:effectLst/>
+                  <a:latin typeface="Apple Color Emoji"/>
+                </a:rPr>
+                <a:t>🤮  </a:t>
+              </a:r>
+              <a:r>
+                <a:rPr lang="en-US" sz="1400" b="0" i="0" dirty="0">
+                  <a:solidFill>
+                    <a:srgbClr val="202122"/>
+                  </a:solidFill>
+                  <a:effectLst/>
+                  <a:latin typeface="Arial" panose="020B0604020202020204" pitchFamily="34" charset="0"/>
+                </a:rPr>
+                <a:t>9</a:t>
+              </a:r>
+              <a:r>
+                <a:rPr lang="en-US" b="0" i="0" dirty="0">
+                  <a:solidFill>
+                    <a:srgbClr val="202122"/>
+                  </a:solidFill>
+                  <a:effectLst/>
+                  <a:latin typeface="Arial" panose="020B0604020202020204" pitchFamily="34" charset="0"/>
+                </a:rPr>
+                <a:t>😈</a:t>
+              </a:r>
+              <a:endParaRPr lang="en-US" dirty="0"/>
+            </a:p>
+          </p:txBody>
+        </p:sp>
+        <p:pic>
+          <p:nvPicPr>
+            <p:cNvPr id="14" name="Graphic 13" descr="Pencil outline">
+              <a:extLst>
+                <a:ext uri="{FF2B5EF4-FFF2-40B4-BE49-F238E27FC236}">
+                  <a16:creationId xmlns:a16="http://schemas.microsoft.com/office/drawing/2014/main" id="{95FECAB2-16CC-82B2-3CA1-05E1A5CA7ED0}"/>
+                </a:ext>
+              </a:extLst>
+            </p:cNvPr>
+            <p:cNvPicPr>
+              <a:picLocks noChangeAspect="1"/>
+            </p:cNvPicPr>
+            <p:nvPr/>
+          </p:nvPicPr>
+          <p:blipFill>
+            <a:blip r:embed="rId3">
+              <a:extLst>
+                <a:ext uri="{28A0092B-C50C-407E-A947-70E740481C1C}">
+                  <a14:useLocalDpi xmlns:a14="http://schemas.microsoft.com/office/drawing/2010/main" val="0"/>
+                </a:ext>
+                <a:ext uri="{96DAC541-7B7A-43D3-8B79-37D633B846F1}">
+                  <asvg:svgBlip xmlns:asvg="http://schemas.microsoft.com/office/drawing/2016/SVG/main" r:embed="rId4"/>
+                </a:ext>
+              </a:extLst>
+            </a:blip>
+            <a:stretch>
+              <a:fillRect/>
+            </a:stretch>
+          </p:blipFill>
+          <p:spPr>
+            <a:xfrm rot="16200000">
+              <a:off x="7116791" y="2927446"/>
+              <a:ext cx="362309" cy="362309"/>
+            </a:xfrm>
+            <a:prstGeom prst="rect">
+              <a:avLst/>
+            </a:prstGeom>
+          </p:spPr>
+        </p:pic>
+        <p:pic>
+          <p:nvPicPr>
+            <p:cNvPr id="16" name="Graphic 15" descr="Robot outline">
+              <a:extLst>
+                <a:ext uri="{FF2B5EF4-FFF2-40B4-BE49-F238E27FC236}">
+                  <a16:creationId xmlns:a16="http://schemas.microsoft.com/office/drawing/2014/main" id="{1564DB2B-79AA-121F-2D31-16904608863B}"/>
+                </a:ext>
+              </a:extLst>
+            </p:cNvPr>
+            <p:cNvPicPr>
+              <a:picLocks noChangeAspect="1"/>
+            </p:cNvPicPr>
+            <p:nvPr/>
+          </p:nvPicPr>
+          <p:blipFill>
+            <a:blip r:embed="rId5">
+              <a:extLst>
+                <a:ext uri="{28A0092B-C50C-407E-A947-70E740481C1C}">
+                  <a14:useLocalDpi xmlns:a14="http://schemas.microsoft.com/office/drawing/2010/main" val="0"/>
+                </a:ext>
+                <a:ext uri="{96DAC541-7B7A-43D3-8B79-37D633B846F1}">
+                  <asvg:svgBlip xmlns:asvg="http://schemas.microsoft.com/office/drawing/2016/SVG/main" r:embed="rId6"/>
+                </a:ext>
+              </a:extLst>
+            </a:blip>
+            <a:stretch>
+              <a:fillRect/>
+            </a:stretch>
+          </p:blipFill>
+          <p:spPr>
+            <a:xfrm>
+              <a:off x="7456393" y="2802346"/>
+              <a:ext cx="508044" cy="508044"/>
+            </a:xfrm>
+            <a:prstGeom prst="rect">
+              <a:avLst/>
+            </a:prstGeom>
+          </p:spPr>
+        </p:pic>
+      </p:grpSp>
+    </p:spTree>
+    <p:extLst>
+      <p:ext uri="{BB962C8B-B14F-4D97-AF65-F5344CB8AC3E}">
+        <p14:creationId xmlns:p14="http://schemas.microsoft.com/office/powerpoint/2010/main" val="2175015624"/>
+      </p:ext>
+    </p:extLst>
+  </p:cSld>
+  <p:clrMapOvr>
+    <a:masterClrMapping/>
+  </p:clrMapOvr>
+</p:sld>
+</file>
+
+<file path=ppt/slides/slide5.xml><?xml version="1.0" encoding="utf-8"?>
 <p:sld xmlns:a="http://schemas.openxmlformats.org/drawingml/2006/main" xmlns:r="http://schemas.openxmlformats.org/officeDocument/2006/relationships" xmlns:p="http://schemas.openxmlformats.org/presentationml/2006/main">
   <p:cSld>
     <p:spTree>
@@ -5717,7 +6265,7 @@
 </p:sld>
 </file>
 
-<file path=ppt/slides/slide5.xml><?xml version="1.0" encoding="utf-8"?>
+<file path=ppt/slides/slide6.xml><?xml version="1.0" encoding="utf-8"?>
 <p:sld xmlns:a="http://schemas.openxmlformats.org/drawingml/2006/main" xmlns:r="http://schemas.openxmlformats.org/officeDocument/2006/relationships" xmlns:p="http://schemas.openxmlformats.org/presentationml/2006/main">
   <p:cSld>
     <p:spTree>
@@ -6729,7 +7277,7 @@
 </p:sld>
 </file>
 
-<file path=ppt/slides/slide6.xml><?xml version="1.0" encoding="utf-8"?>
+<file path=ppt/slides/slide7.xml><?xml version="1.0" encoding="utf-8"?>
 <p:sld xmlns:a="http://schemas.openxmlformats.org/drawingml/2006/main" xmlns:r="http://schemas.openxmlformats.org/officeDocument/2006/relationships" xmlns:p="http://schemas.openxmlformats.org/presentationml/2006/main">
   <p:cSld>
     <p:spTree>
@@ -7628,7 +8176,7 @@
 </p:sld>
 </file>
 
-<file path=ppt/slides/slide7.xml><?xml version="1.0" encoding="utf-8"?>
+<file path=ppt/slides/slide8.xml><?xml version="1.0" encoding="utf-8"?>
 <p:sld xmlns:a="http://schemas.openxmlformats.org/drawingml/2006/main" xmlns:r="http://schemas.openxmlformats.org/officeDocument/2006/relationships" xmlns:p="http://schemas.openxmlformats.org/presentationml/2006/main">
   <p:cSld>
     <p:spTree>

</xml_diff>